<commit_message>
Minor tweak to mental map, and add sample lesson for simple subsetting
</commit_message>
<xml_diff>
--- a/extraction-mental-map.pptx
+++ b/extraction-mental-map.pptx
@@ -104,6 +104,11 @@
       </a:defRPr>
     </a:lvl9pPr>
   </p:defaultTextStyle>
+  <p:extLst>
+    <p:ext uri="{EFAFB233-063F-42B5-8137-9DF3F51BA10A}">
+      <p15:sldGuideLst xmlns:p15="http://schemas.microsoft.com/office/powerpoint/2012/main"/>
+    </p:ext>
+  </p:extLst>
 </p:presentation>
 </file>
 
@@ -238,7 +243,7 @@
           <a:p>
             <a:fld id="{B01614EA-30D7-47B6-9A9E-1702887157CA}" type="datetimeFigureOut">
               <a:rPr lang="en-US" smtClean="0"/>
-              <a:t>2020-03-19</a:t>
+              <a:t>2020-03-29</a:t>
             </a:fld>
             <a:endParaRPr lang="en-US"/>
           </a:p>
@@ -408,7 +413,7 @@
           <a:p>
             <a:fld id="{B01614EA-30D7-47B6-9A9E-1702887157CA}" type="datetimeFigureOut">
               <a:rPr lang="en-US" smtClean="0"/>
-              <a:t>2020-03-19</a:t>
+              <a:t>2020-03-29</a:t>
             </a:fld>
             <a:endParaRPr lang="en-US"/>
           </a:p>
@@ -588,7 +593,7 @@
           <a:p>
             <a:fld id="{B01614EA-30D7-47B6-9A9E-1702887157CA}" type="datetimeFigureOut">
               <a:rPr lang="en-US" smtClean="0"/>
-              <a:t>2020-03-19</a:t>
+              <a:t>2020-03-29</a:t>
             </a:fld>
             <a:endParaRPr lang="en-US"/>
           </a:p>
@@ -758,7 +763,7 @@
           <a:p>
             <a:fld id="{B01614EA-30D7-47B6-9A9E-1702887157CA}" type="datetimeFigureOut">
               <a:rPr lang="en-US" smtClean="0"/>
-              <a:t>2020-03-19</a:t>
+              <a:t>2020-03-29</a:t>
             </a:fld>
             <a:endParaRPr lang="en-US"/>
           </a:p>
@@ -1004,7 +1009,7 @@
           <a:p>
             <a:fld id="{B01614EA-30D7-47B6-9A9E-1702887157CA}" type="datetimeFigureOut">
               <a:rPr lang="en-US" smtClean="0"/>
-              <a:t>2020-03-19</a:t>
+              <a:t>2020-03-29</a:t>
             </a:fld>
             <a:endParaRPr lang="en-US"/>
           </a:p>
@@ -1236,7 +1241,7 @@
           <a:p>
             <a:fld id="{B01614EA-30D7-47B6-9A9E-1702887157CA}" type="datetimeFigureOut">
               <a:rPr lang="en-US" smtClean="0"/>
-              <a:t>2020-03-19</a:t>
+              <a:t>2020-03-29</a:t>
             </a:fld>
             <a:endParaRPr lang="en-US"/>
           </a:p>
@@ -1603,7 +1608,7 @@
           <a:p>
             <a:fld id="{B01614EA-30D7-47B6-9A9E-1702887157CA}" type="datetimeFigureOut">
               <a:rPr lang="en-US" smtClean="0"/>
-              <a:t>2020-03-19</a:t>
+              <a:t>2020-03-29</a:t>
             </a:fld>
             <a:endParaRPr lang="en-US"/>
           </a:p>
@@ -1721,7 +1726,7 @@
           <a:p>
             <a:fld id="{B01614EA-30D7-47B6-9A9E-1702887157CA}" type="datetimeFigureOut">
               <a:rPr lang="en-US" smtClean="0"/>
-              <a:t>2020-03-19</a:t>
+              <a:t>2020-03-29</a:t>
             </a:fld>
             <a:endParaRPr lang="en-US"/>
           </a:p>
@@ -1816,7 +1821,7 @@
           <a:p>
             <a:fld id="{B01614EA-30D7-47B6-9A9E-1702887157CA}" type="datetimeFigureOut">
               <a:rPr lang="en-US" smtClean="0"/>
-              <a:t>2020-03-19</a:t>
+              <a:t>2020-03-29</a:t>
             </a:fld>
             <a:endParaRPr lang="en-US"/>
           </a:p>
@@ -2093,7 +2098,7 @@
           <a:p>
             <a:fld id="{B01614EA-30D7-47B6-9A9E-1702887157CA}" type="datetimeFigureOut">
               <a:rPr lang="en-US" smtClean="0"/>
-              <a:t>2020-03-19</a:t>
+              <a:t>2020-03-29</a:t>
             </a:fld>
             <a:endParaRPr lang="en-US"/>
           </a:p>
@@ -2346,7 +2351,7 @@
           <a:p>
             <a:fld id="{B01614EA-30D7-47B6-9A9E-1702887157CA}" type="datetimeFigureOut">
               <a:rPr lang="en-US" smtClean="0"/>
-              <a:t>2020-03-19</a:t>
+              <a:t>2020-03-29</a:t>
             </a:fld>
             <a:endParaRPr lang="en-US"/>
           </a:p>
@@ -2559,7 +2564,7 @@
           <a:p>
             <a:fld id="{B01614EA-30D7-47B6-9A9E-1702887157CA}" type="datetimeFigureOut">
               <a:rPr lang="en-US" smtClean="0"/>
-              <a:t>2020-03-19</a:t>
+              <a:t>2020-03-29</a:t>
             </a:fld>
             <a:endParaRPr lang="en-US"/>
           </a:p>
@@ -3007,92 +3012,6 @@
           </a:p>
         </p:txBody>
       </p:sp>
-      <p:sp>
-        <p:nvSpPr>
-          <p:cNvPr id="12" name="Rectangle 11"/>
-          <p:cNvSpPr/>
-          <p:nvPr/>
-        </p:nvSpPr>
-        <p:spPr>
-          <a:xfrm>
-            <a:off x="510277" y="1298706"/>
-            <a:ext cx="1443643" cy="548640"/>
-          </a:xfrm>
-          <a:prstGeom prst="rect">
-            <a:avLst/>
-          </a:prstGeom>
-        </p:spPr>
-        <p:style>
-          <a:lnRef idx="2">
-            <a:schemeClr val="accent1">
-              <a:shade val="50000"/>
-            </a:schemeClr>
-          </a:lnRef>
-          <a:fillRef idx="1">
-            <a:schemeClr val="accent1"/>
-          </a:fillRef>
-          <a:effectRef idx="0">
-            <a:schemeClr val="accent1"/>
-          </a:effectRef>
-          <a:fontRef idx="minor">
-            <a:schemeClr val="lt1"/>
-          </a:fontRef>
-        </p:style>
-        <p:txBody>
-          <a:bodyPr rtlCol="0" anchor="ctr"/>
-          <a:lstStyle/>
-          <a:p>
-            <a:pPr algn="ctr"/>
-            <a:r>
-              <a:rPr lang="en-US" dirty="0" smtClean="0"/>
-              <a:t>Fundamental data activity</a:t>
-            </a:r>
-          </a:p>
-        </p:txBody>
-      </p:sp>
-      <p:sp>
-        <p:nvSpPr>
-          <p:cNvPr id="18" name="TextBox 17"/>
-          <p:cNvSpPr txBox="1"/>
-          <p:nvPr/>
-        </p:nvSpPr>
-        <p:spPr>
-          <a:xfrm>
-            <a:off x="510277" y="197521"/>
-            <a:ext cx="626703" cy="369332"/>
-          </a:xfrm>
-          <a:prstGeom prst="rect">
-            <a:avLst/>
-          </a:prstGeom>
-          <a:noFill/>
-        </p:spPr>
-        <p:txBody>
-          <a:bodyPr wrap="square" rtlCol="0">
-            <a:spAutoFit/>
-          </a:bodyPr>
-          <a:lstStyle/>
-          <a:p>
-            <a:pPr algn="ctr"/>
-            <a:r>
-              <a:rPr lang="en-US" dirty="0" smtClean="0">
-                <a:solidFill>
-                  <a:schemeClr val="bg2">
-                    <a:lumMod val="90000"/>
-                  </a:schemeClr>
-                </a:solidFill>
-              </a:rPr>
-              <a:t>Is a</a:t>
-            </a:r>
-            <a:endParaRPr lang="en-US" dirty="0">
-              <a:solidFill>
-                <a:schemeClr val="bg2">
-                  <a:lumMod val="90000"/>
-                </a:schemeClr>
-              </a:solidFill>
-            </a:endParaRPr>
-          </a:p>
-        </p:txBody>
-      </p:sp>
       <p:graphicFrame>
         <p:nvGraphicFramePr>
           <p:cNvPr id="19" name="Table 18"/>
@@ -3839,8 +3758,8 @@
         </p:nvSpPr>
         <p:spPr>
           <a:xfrm>
-            <a:off x="213481" y="551219"/>
-            <a:ext cx="2093197" cy="538543"/>
+            <a:off x="97528" y="186273"/>
+            <a:ext cx="2093197" cy="504570"/>
           </a:xfrm>
           <a:prstGeom prst="rect">
             <a:avLst/>
@@ -3874,76 +3793,6 @@
           </a:p>
         </p:txBody>
       </p:sp>
-      <p:cxnSp>
-        <p:nvCxnSpPr>
-          <p:cNvPr id="32" name="Straight Arrow Connector 31"/>
-          <p:cNvCxnSpPr>
-            <a:stCxn id="12" idx="2"/>
-            <a:endCxn id="30" idx="0"/>
-          </p:cNvCxnSpPr>
-          <p:nvPr/>
-        </p:nvCxnSpPr>
-        <p:spPr>
-          <a:xfrm flipV="1">
-            <a:off x="1232099" y="551219"/>
-            <a:ext cx="27981" cy="1296127"/>
-          </a:xfrm>
-          <a:prstGeom prst="straightConnector1">
-            <a:avLst/>
-          </a:prstGeom>
-          <a:ln>
-            <a:headEnd type="triangle"/>
-            <a:tailEnd type="none"/>
-          </a:ln>
-        </p:spPr>
-        <p:style>
-          <a:lnRef idx="1">
-            <a:schemeClr val="accent1"/>
-          </a:lnRef>
-          <a:fillRef idx="0">
-            <a:schemeClr val="accent1"/>
-          </a:fillRef>
-          <a:effectRef idx="0">
-            <a:schemeClr val="accent1"/>
-          </a:effectRef>
-          <a:fontRef idx="minor">
-            <a:schemeClr val="tx1"/>
-          </a:fontRef>
-        </p:style>
-      </p:cxnSp>
-      <p:cxnSp>
-        <p:nvCxnSpPr>
-          <p:cNvPr id="41" name="Straight Arrow Connector 40"/>
-          <p:cNvCxnSpPr/>
-          <p:nvPr/>
-        </p:nvCxnSpPr>
-        <p:spPr>
-          <a:xfrm flipV="1">
-            <a:off x="2306678" y="820490"/>
-            <a:ext cx="1007025" cy="1"/>
-          </a:xfrm>
-          <a:prstGeom prst="straightConnector1">
-            <a:avLst/>
-          </a:prstGeom>
-          <a:ln>
-            <a:tailEnd type="triangle"/>
-          </a:ln>
-        </p:spPr>
-        <p:style>
-          <a:lnRef idx="1">
-            <a:schemeClr val="accent1"/>
-          </a:lnRef>
-          <a:fillRef idx="0">
-            <a:schemeClr val="accent1"/>
-          </a:fillRef>
-          <a:effectRef idx="0">
-            <a:schemeClr val="accent1"/>
-          </a:effectRef>
-          <a:fontRef idx="minor">
-            <a:schemeClr val="tx1"/>
-          </a:fontRef>
-        </p:style>
-      </p:cxnSp>
       <p:sp>
         <p:nvSpPr>
           <p:cNvPr id="46" name="TextBox 45"/>
@@ -3952,7 +3801,7 @@
         </p:nvSpPr>
         <p:spPr>
           <a:xfrm>
-            <a:off x="2179105" y="418457"/>
+            <a:off x="2312492" y="115185"/>
             <a:ext cx="1257992" cy="369332"/>
           </a:xfrm>
           <a:prstGeom prst="rect">
@@ -3975,7 +3824,7 @@
                   </a:schemeClr>
                 </a:solidFill>
               </a:rPr>
-              <a:t>Requires</a:t>
+              <a:t>Requires/is</a:t>
             </a:r>
             <a:endParaRPr lang="en-US" dirty="0">
               <a:solidFill>
@@ -3995,7 +3844,7 @@
         </p:nvGrpSpPr>
         <p:grpSpPr>
           <a:xfrm>
-            <a:off x="3713487" y="3090027"/>
+            <a:off x="3713487" y="3788300"/>
             <a:ext cx="2702923" cy="584775"/>
             <a:chOff x="79672" y="4876172"/>
             <a:chExt cx="2702923" cy="584775"/>
@@ -4106,7 +3955,6 @@
                 <a:rPr lang="en-US" b="1" dirty="0" smtClean="0"/>
                 <a:t>names</a:t>
               </a:r>
-              <a:endParaRPr lang="en-US" b="1" dirty="0" smtClean="0"/>
             </a:p>
           </p:txBody>
         </p:sp>
@@ -4485,7 +4333,7 @@
         </p:nvGrpSpPr>
         <p:grpSpPr>
           <a:xfrm>
-            <a:off x="244730" y="3090026"/>
+            <a:off x="244730" y="3788299"/>
             <a:ext cx="2702923" cy="584775"/>
             <a:chOff x="79672" y="4876172"/>
             <a:chExt cx="2702923" cy="584775"/>
@@ -4637,18 +4485,18 @@
           <p:cNvPr id="177" name="Elbow Connector 176"/>
           <p:cNvCxnSpPr>
             <a:stCxn id="54" idx="2"/>
-            <a:endCxn id="218" idx="0"/>
+            <a:endCxn id="247" idx="0"/>
           </p:cNvCxnSpPr>
           <p:nvPr/>
         </p:nvCxnSpPr>
         <p:spPr>
           <a:xfrm rot="5400000">
-            <a:off x="2861468" y="-169318"/>
-            <a:ext cx="1645438" cy="4173692"/>
+            <a:off x="4414999" y="522549"/>
+            <a:ext cx="783774" cy="1928294"/>
           </a:xfrm>
           <a:prstGeom prst="bentConnector3">
             <a:avLst>
-              <a:gd name="adj1" fmla="val 58868"/>
+              <a:gd name="adj1" fmla="val 50000"/>
             </a:avLst>
           </a:prstGeom>
           <a:ln>
@@ -4675,19 +4523,17 @@
           <p:cNvPr id="179" name="Elbow Connector 178"/>
           <p:cNvCxnSpPr>
             <a:stCxn id="53" idx="2"/>
-            <a:endCxn id="219" idx="0"/>
+            <a:endCxn id="247" idx="3"/>
           </p:cNvCxnSpPr>
           <p:nvPr/>
         </p:nvCxnSpPr>
         <p:spPr>
           <a:xfrm rot="5400000">
-            <a:off x="5430204" y="723693"/>
-            <a:ext cx="1576615" cy="2318847"/>
-          </a:xfrm>
-          <a:prstGeom prst="bentConnector3">
-            <a:avLst>
-              <a:gd name="adj1" fmla="val 83935"/>
-            </a:avLst>
+            <a:off x="6073024" y="847993"/>
+            <a:ext cx="1058094" cy="1551727"/>
+          </a:xfrm>
+          <a:prstGeom prst="bentConnector2">
+            <a:avLst/>
           </a:prstGeom>
           <a:ln>
             <a:tailEnd type="triangle"/>
@@ -4919,7 +4765,7 @@
         </p:nvSpPr>
         <p:spPr>
           <a:xfrm>
-            <a:off x="6523866" y="2059898"/>
+            <a:off x="6508948" y="1801639"/>
             <a:ext cx="878104" cy="369332"/>
           </a:xfrm>
           <a:prstGeom prst="rect">
@@ -4942,7 +4788,7 @@
                   </a:schemeClr>
                 </a:solidFill>
               </a:rPr>
-              <a:t>Using</a:t>
+              <a:t>Using a</a:t>
             </a:r>
             <a:endParaRPr lang="en-US" dirty="0">
               <a:solidFill>
@@ -4962,7 +4808,7 @@
         </p:nvSpPr>
         <p:spPr>
           <a:xfrm>
-            <a:off x="1610436" y="2715647"/>
+            <a:off x="1610436" y="3413920"/>
             <a:ext cx="1505667" cy="369332"/>
           </a:xfrm>
           <a:prstGeom prst="rect">
@@ -5005,7 +4851,7 @@
         </p:nvSpPr>
         <p:spPr>
           <a:xfrm>
-            <a:off x="5018199" y="2689491"/>
+            <a:off x="5018199" y="3387764"/>
             <a:ext cx="1505667" cy="369332"/>
           </a:xfrm>
           <a:prstGeom prst="rect">
@@ -5042,32 +4888,18 @@
       </p:sp>
       <p:sp>
         <p:nvSpPr>
-          <p:cNvPr id="208" name="Rectangle 207"/>
+          <p:cNvPr id="217" name="Rectangle 216"/>
           <p:cNvSpPr/>
           <p:nvPr/>
         </p:nvSpPr>
         <p:spPr>
           <a:xfrm>
-            <a:off x="2965699" y="4162758"/>
+            <a:off x="2256689" y="4900389"/>
             <a:ext cx="1180408" cy="548640"/>
           </a:xfrm>
           <a:prstGeom prst="rect">
             <a:avLst/>
           </a:prstGeom>
-          <a:solidFill>
-            <a:schemeClr val="accent2">
-              <a:lumMod val="40000"/>
-              <a:lumOff val="60000"/>
-            </a:schemeClr>
-          </a:solidFill>
-          <a:ln>
-            <a:solidFill>
-              <a:schemeClr val="accent2">
-                <a:lumMod val="40000"/>
-                <a:lumOff val="60000"/>
-              </a:schemeClr>
-            </a:solidFill>
-          </a:ln>
         </p:spPr>
         <p:style>
           <a:lnRef idx="2">
@@ -5092,177 +4924,6 @@
             <a:pPr algn="ctr"/>
             <a:r>
               <a:rPr lang="en-US" b="1" dirty="0" smtClean="0"/>
-              <a:t>comma ,</a:t>
-            </a:r>
-            <a:endParaRPr lang="en-US" b="1" dirty="0" smtClean="0"/>
-          </a:p>
-        </p:txBody>
-      </p:sp>
-      <p:cxnSp>
-        <p:nvCxnSpPr>
-          <p:cNvPr id="210" name="Elbow Connector 209"/>
-          <p:cNvCxnSpPr>
-            <a:stCxn id="173" idx="2"/>
-            <a:endCxn id="208" idx="1"/>
-          </p:cNvCxnSpPr>
-          <p:nvPr/>
-        </p:nvCxnSpPr>
-        <p:spPr>
-          <a:xfrm rot="16200000" flipH="1">
-            <a:off x="2271402" y="3742780"/>
-            <a:ext cx="780345" cy="608250"/>
-          </a:xfrm>
-          <a:prstGeom prst="bentConnector2">
-            <a:avLst/>
-          </a:prstGeom>
-          <a:ln>
-            <a:solidFill>
-              <a:schemeClr val="accent1">
-                <a:lumMod val="20000"/>
-                <a:lumOff val="80000"/>
-              </a:schemeClr>
-            </a:solidFill>
-            <a:tailEnd type="triangle"/>
-          </a:ln>
-        </p:spPr>
-        <p:style>
-          <a:lnRef idx="1">
-            <a:schemeClr val="accent1"/>
-          </a:lnRef>
-          <a:fillRef idx="0">
-            <a:schemeClr val="accent1"/>
-          </a:fillRef>
-          <a:effectRef idx="0">
-            <a:schemeClr val="accent1"/>
-          </a:effectRef>
-          <a:fontRef idx="minor">
-            <a:schemeClr val="tx1"/>
-          </a:fontRef>
-        </p:style>
-      </p:cxnSp>
-      <p:cxnSp>
-        <p:nvCxnSpPr>
-          <p:cNvPr id="212" name="Elbow Connector 211"/>
-          <p:cNvCxnSpPr>
-            <a:stCxn id="129" idx="2"/>
-            <a:endCxn id="208" idx="3"/>
-          </p:cNvCxnSpPr>
-          <p:nvPr/>
-        </p:nvCxnSpPr>
-        <p:spPr>
-          <a:xfrm rot="5400000">
-            <a:off x="4595985" y="3206857"/>
-            <a:ext cx="780344" cy="1680099"/>
-          </a:xfrm>
-          <a:prstGeom prst="bentConnector2">
-            <a:avLst/>
-          </a:prstGeom>
-          <a:ln>
-            <a:solidFill>
-              <a:schemeClr val="accent1">
-                <a:lumMod val="20000"/>
-                <a:lumOff val="80000"/>
-              </a:schemeClr>
-            </a:solidFill>
-            <a:tailEnd type="triangle"/>
-          </a:ln>
-        </p:spPr>
-        <p:style>
-          <a:lnRef idx="1">
-            <a:schemeClr val="accent1"/>
-          </a:lnRef>
-          <a:fillRef idx="0">
-            <a:schemeClr val="accent1"/>
-          </a:fillRef>
-          <a:effectRef idx="0">
-            <a:schemeClr val="accent1"/>
-          </a:effectRef>
-          <a:fontRef idx="minor">
-            <a:schemeClr val="tx1"/>
-          </a:fontRef>
-        </p:style>
-      </p:cxnSp>
-      <p:sp>
-        <p:nvSpPr>
-          <p:cNvPr id="214" name="TextBox 213"/>
-          <p:cNvSpPr txBox="1"/>
-          <p:nvPr/>
-        </p:nvSpPr>
-        <p:spPr>
-          <a:xfrm>
-            <a:off x="2730476" y="3793426"/>
-            <a:ext cx="1650854" cy="369332"/>
-          </a:xfrm>
-          <a:prstGeom prst="rect">
-            <a:avLst/>
-          </a:prstGeom>
-          <a:noFill/>
-        </p:spPr>
-        <p:txBody>
-          <a:bodyPr wrap="square" rtlCol="0">
-            <a:spAutoFit/>
-          </a:bodyPr>
-          <a:lstStyle/>
-          <a:p>
-            <a:pPr algn="ctr"/>
-            <a:r>
-              <a:rPr lang="en-US" dirty="0" smtClean="0">
-                <a:solidFill>
-                  <a:schemeClr val="bg2">
-                    <a:lumMod val="90000"/>
-                  </a:schemeClr>
-                </a:solidFill>
-              </a:rPr>
-              <a:t>Separated with</a:t>
-            </a:r>
-            <a:endParaRPr lang="en-US" dirty="0">
-              <a:solidFill>
-                <a:schemeClr val="bg2">
-                  <a:lumMod val="90000"/>
-                </a:schemeClr>
-              </a:solidFill>
-            </a:endParaRPr>
-          </a:p>
-        </p:txBody>
-      </p:sp>
-      <p:sp>
-        <p:nvSpPr>
-          <p:cNvPr id="217" name="Rectangle 216"/>
-          <p:cNvSpPr/>
-          <p:nvPr/>
-        </p:nvSpPr>
-        <p:spPr>
-          <a:xfrm>
-            <a:off x="2256689" y="4900389"/>
-            <a:ext cx="1180408" cy="548640"/>
-          </a:xfrm>
-          <a:prstGeom prst="rect">
-            <a:avLst/>
-          </a:prstGeom>
-        </p:spPr>
-        <p:style>
-          <a:lnRef idx="2">
-            <a:schemeClr val="accent1">
-              <a:shade val="50000"/>
-            </a:schemeClr>
-          </a:lnRef>
-          <a:fillRef idx="1">
-            <a:schemeClr val="accent1"/>
-          </a:fillRef>
-          <a:effectRef idx="0">
-            <a:schemeClr val="accent1"/>
-          </a:effectRef>
-          <a:fontRef idx="minor">
-            <a:schemeClr val="lt1"/>
-          </a:fontRef>
-        </p:style>
-        <p:txBody>
-          <a:bodyPr rtlCol="0" anchor="ctr"/>
-          <a:lstStyle/>
-          <a:p>
-            <a:pPr algn="ctr"/>
-            <a:r>
-              <a:rPr lang="en-US" b="1" dirty="0" smtClean="0"/>
               <a:t>Less Data!</a:t>
             </a:r>
           </a:p>
@@ -5276,7 +4937,7 @@
         </p:nvSpPr>
         <p:spPr>
           <a:xfrm>
-            <a:off x="189559" y="2740247"/>
+            <a:off x="189559" y="3404109"/>
             <a:ext cx="2815564" cy="1004899"/>
           </a:xfrm>
           <a:prstGeom prst="rect">
@@ -5324,7 +4985,7 @@
         </p:nvSpPr>
         <p:spPr>
           <a:xfrm>
-            <a:off x="3604480" y="2671424"/>
+            <a:off x="3604480" y="3369697"/>
             <a:ext cx="2909214" cy="1073722"/>
           </a:xfrm>
           <a:prstGeom prst="rect">
@@ -5375,8 +5036,8 @@
         </p:nvCxnSpPr>
         <p:spPr>
           <a:xfrm rot="16200000" flipH="1">
-            <a:off x="1212234" y="4130253"/>
-            <a:ext cx="1429563" cy="659348"/>
+            <a:off x="1544165" y="4462184"/>
+            <a:ext cx="765701" cy="659348"/>
           </a:xfrm>
           <a:prstGeom prst="bentConnector2">
             <a:avLst/>
@@ -5404,20 +5065,18 @@
         <p:nvCxnSpPr>
           <p:cNvPr id="223" name="Elbow Connector 222"/>
           <p:cNvCxnSpPr>
-            <a:stCxn id="219" idx="3"/>
+            <a:stCxn id="219" idx="2"/>
             <a:endCxn id="217" idx="3"/>
           </p:cNvCxnSpPr>
           <p:nvPr/>
         </p:nvCxnSpPr>
         <p:spPr>
-          <a:xfrm flipH="1">
-            <a:off x="3437097" y="3208285"/>
-            <a:ext cx="3076597" cy="1966424"/>
-          </a:xfrm>
-          <a:prstGeom prst="bentConnector3">
-            <a:avLst>
-              <a:gd name="adj1" fmla="val -7430"/>
-            </a:avLst>
+          <a:xfrm rot="5400000">
+            <a:off x="3882447" y="3998069"/>
+            <a:ext cx="731290" cy="1621990"/>
+          </a:xfrm>
+          <a:prstGeom prst="bentConnector2">
+            <a:avLst/>
           </a:prstGeom>
           <a:ln>
             <a:tailEnd type="triangle"/>
@@ -5489,7 +5148,7 @@
         </p:nvSpPr>
         <p:spPr>
           <a:xfrm>
-            <a:off x="4547993" y="4856719"/>
+            <a:off x="4157408" y="4827125"/>
             <a:ext cx="876327" cy="369332"/>
           </a:xfrm>
           <a:prstGeom prst="rect">
@@ -5532,7 +5191,7 @@
         </p:nvSpPr>
         <p:spPr>
           <a:xfrm>
-            <a:off x="179387" y="2759854"/>
+            <a:off x="179387" y="3458127"/>
             <a:ext cx="1505667" cy="369332"/>
           </a:xfrm>
           <a:prstGeom prst="rect">
@@ -5575,7 +5234,7 @@
         </p:nvSpPr>
         <p:spPr>
           <a:xfrm>
-            <a:off x="3561484" y="2727947"/>
+            <a:off x="3561484" y="3426220"/>
             <a:ext cx="1505667" cy="369332"/>
           </a:xfrm>
           <a:prstGeom prst="rect">
@@ -5944,7 +5603,7 @@
         </p:nvSpPr>
         <p:spPr>
           <a:xfrm>
-            <a:off x="4884742" y="1716102"/>
+            <a:off x="4929488" y="1154344"/>
             <a:ext cx="878104" cy="369332"/>
           </a:xfrm>
           <a:prstGeom prst="rect">
@@ -5967,7 +5626,657 @@
                   </a:schemeClr>
                 </a:solidFill>
               </a:rPr>
-              <a:t>Using</a:t>
+              <a:t>Using a</a:t>
+            </a:r>
+            <a:endParaRPr lang="en-US" dirty="0">
+              <a:solidFill>
+                <a:schemeClr val="bg2">
+                  <a:lumMod val="90000"/>
+                </a:schemeClr>
+              </a:solidFill>
+            </a:endParaRPr>
+          </a:p>
+        </p:txBody>
+      </p:sp>
+      <p:sp>
+        <p:nvSpPr>
+          <p:cNvPr id="247" name="Rectangle 246"/>
+          <p:cNvSpPr/>
+          <p:nvPr/>
+        </p:nvSpPr>
+        <p:spPr>
+          <a:xfrm>
+            <a:off x="1859271" y="1878583"/>
+            <a:ext cx="3966936" cy="548640"/>
+          </a:xfrm>
+          <a:prstGeom prst="rect">
+            <a:avLst/>
+          </a:prstGeom>
+          <a:solidFill>
+            <a:schemeClr val="accent6"/>
+          </a:solidFill>
+          <a:ln>
+            <a:solidFill>
+              <a:schemeClr val="accent2"/>
+            </a:solidFill>
+          </a:ln>
+        </p:spPr>
+        <p:style>
+          <a:lnRef idx="2">
+            <a:schemeClr val="accent1">
+              <a:shade val="50000"/>
+            </a:schemeClr>
+          </a:lnRef>
+          <a:fillRef idx="1">
+            <a:schemeClr val="accent1"/>
+          </a:fillRef>
+          <a:effectRef idx="0">
+            <a:schemeClr val="accent1"/>
+          </a:effectRef>
+          <a:fontRef idx="minor">
+            <a:schemeClr val="lt1"/>
+          </a:fontRef>
+        </p:style>
+        <p:txBody>
+          <a:bodyPr rtlCol="0" anchor="ctr"/>
+          <a:lstStyle/>
+          <a:p>
+            <a:pPr algn="ctr"/>
+            <a:r>
+              <a:rPr lang="en-US" b="1" dirty="0" err="1" smtClean="0"/>
+              <a:t>function_name</a:t>
+            </a:r>
+            <a:r>
+              <a:rPr lang="en-US" b="1" dirty="0" smtClean="0"/>
+              <a:t>(.data, </a:t>
+            </a:r>
+            <a:r>
+              <a:rPr lang="en-US" b="1" dirty="0" smtClean="0"/>
+              <a:t>.thing1, .thing2)</a:t>
+            </a:r>
+            <a:endParaRPr lang="en-US" b="1" dirty="0" smtClean="0"/>
+          </a:p>
+        </p:txBody>
+      </p:sp>
+      <p:cxnSp>
+        <p:nvCxnSpPr>
+          <p:cNvPr id="253" name="Straight Arrow Connector 252"/>
+          <p:cNvCxnSpPr>
+            <a:stCxn id="218" idx="3"/>
+            <a:endCxn id="219" idx="1"/>
+          </p:cNvCxnSpPr>
+          <p:nvPr/>
+        </p:nvCxnSpPr>
+        <p:spPr>
+          <a:xfrm flipV="1">
+            <a:off x="3005123" y="3906558"/>
+            <a:ext cx="599357" cy="1"/>
+          </a:xfrm>
+          <a:prstGeom prst="straightConnector1">
+            <a:avLst/>
+          </a:prstGeom>
+          <a:ln>
+            <a:tailEnd type="triangle"/>
+          </a:ln>
+        </p:spPr>
+        <p:style>
+          <a:lnRef idx="1">
+            <a:schemeClr val="accent1"/>
+          </a:lnRef>
+          <a:fillRef idx="0">
+            <a:schemeClr val="accent1"/>
+          </a:fillRef>
+          <a:effectRef idx="0">
+            <a:schemeClr val="accent1"/>
+          </a:effectRef>
+          <a:fontRef idx="minor">
+            <a:schemeClr val="tx1"/>
+          </a:fontRef>
+        </p:style>
+      </p:cxnSp>
+      <p:sp>
+        <p:nvSpPr>
+          <p:cNvPr id="258" name="TextBox 257"/>
+          <p:cNvSpPr txBox="1"/>
+          <p:nvPr/>
+        </p:nvSpPr>
+        <p:spPr>
+          <a:xfrm>
+            <a:off x="670578" y="1951669"/>
+            <a:ext cx="1393654" cy="369332"/>
+          </a:xfrm>
+          <a:prstGeom prst="rect">
+            <a:avLst/>
+          </a:prstGeom>
+          <a:noFill/>
+        </p:spPr>
+        <p:txBody>
+          <a:bodyPr wrap="square" rtlCol="0">
+            <a:spAutoFit/>
+          </a:bodyPr>
+          <a:lstStyle/>
+          <a:p>
+            <a:pPr algn="ctr"/>
+            <a:r>
+              <a:rPr lang="en-US" dirty="0" smtClean="0">
+                <a:solidFill>
+                  <a:schemeClr val="bg2">
+                    <a:lumMod val="90000"/>
+                  </a:schemeClr>
+                </a:solidFill>
+              </a:rPr>
+              <a:t>Signature</a:t>
+            </a:r>
+            <a:endParaRPr lang="en-US" dirty="0">
+              <a:solidFill>
+                <a:schemeClr val="bg2">
+                  <a:lumMod val="90000"/>
+                </a:schemeClr>
+              </a:solidFill>
+            </a:endParaRPr>
+          </a:p>
+        </p:txBody>
+      </p:sp>
+      <p:cxnSp>
+        <p:nvCxnSpPr>
+          <p:cNvPr id="59" name="Elbow Connector 58"/>
+          <p:cNvCxnSpPr>
+            <a:stCxn id="247" idx="2"/>
+            <a:endCxn id="218" idx="0"/>
+          </p:cNvCxnSpPr>
+          <p:nvPr/>
+        </p:nvCxnSpPr>
+        <p:spPr>
+          <a:xfrm rot="5400000">
+            <a:off x="2231597" y="1792967"/>
+            <a:ext cx="976886" cy="2245398"/>
+          </a:xfrm>
+          <a:prstGeom prst="bentConnector3">
+            <a:avLst>
+              <a:gd name="adj1" fmla="val 50000"/>
+            </a:avLst>
+          </a:prstGeom>
+          <a:ln>
+            <a:tailEnd type="triangle"/>
+          </a:ln>
+        </p:spPr>
+        <p:style>
+          <a:lnRef idx="1">
+            <a:schemeClr val="accent1"/>
+          </a:lnRef>
+          <a:fillRef idx="0">
+            <a:schemeClr val="accent1"/>
+          </a:fillRef>
+          <a:effectRef idx="0">
+            <a:schemeClr val="accent1"/>
+          </a:effectRef>
+          <a:fontRef idx="minor">
+            <a:schemeClr val="tx1"/>
+          </a:fontRef>
+        </p:style>
+      </p:cxnSp>
+      <p:cxnSp>
+        <p:nvCxnSpPr>
+          <p:cNvPr id="62" name="Elbow Connector 61"/>
+          <p:cNvCxnSpPr>
+            <a:stCxn id="247" idx="2"/>
+            <a:endCxn id="219" idx="0"/>
+          </p:cNvCxnSpPr>
+          <p:nvPr/>
+        </p:nvCxnSpPr>
+        <p:spPr>
+          <a:xfrm rot="16200000" flipH="1">
+            <a:off x="3979676" y="2290286"/>
+            <a:ext cx="942474" cy="1216348"/>
+          </a:xfrm>
+          <a:prstGeom prst="bentConnector3">
+            <a:avLst>
+              <a:gd name="adj1" fmla="val 76460"/>
+            </a:avLst>
+          </a:prstGeom>
+          <a:ln>
+            <a:tailEnd type="triangle"/>
+          </a:ln>
+        </p:spPr>
+        <p:style>
+          <a:lnRef idx="1">
+            <a:schemeClr val="accent1"/>
+          </a:lnRef>
+          <a:fillRef idx="0">
+            <a:schemeClr val="accent1"/>
+          </a:fillRef>
+          <a:effectRef idx="0">
+            <a:schemeClr val="accent1"/>
+          </a:effectRef>
+          <a:fontRef idx="minor">
+            <a:schemeClr val="tx1"/>
+          </a:fontRef>
+        </p:style>
+      </p:cxnSp>
+      <p:sp>
+        <p:nvSpPr>
+          <p:cNvPr id="70" name="Rectangle 69"/>
+          <p:cNvSpPr/>
+          <p:nvPr/>
+        </p:nvSpPr>
+        <p:spPr>
+          <a:xfrm>
+            <a:off x="97528" y="1157649"/>
+            <a:ext cx="2093197" cy="548640"/>
+          </a:xfrm>
+          <a:prstGeom prst="rect">
+            <a:avLst/>
+          </a:prstGeom>
+        </p:spPr>
+        <p:style>
+          <a:lnRef idx="2">
+            <a:schemeClr val="accent1">
+              <a:shade val="50000"/>
+            </a:schemeClr>
+          </a:lnRef>
+          <a:fillRef idx="1">
+            <a:schemeClr val="accent1"/>
+          </a:fillRef>
+          <a:effectRef idx="0">
+            <a:schemeClr val="accent1"/>
+          </a:effectRef>
+          <a:fontRef idx="minor">
+            <a:schemeClr val="lt1"/>
+          </a:fontRef>
+        </p:style>
+        <p:txBody>
+          <a:bodyPr rtlCol="0" anchor="ctr"/>
+          <a:lstStyle/>
+          <a:p>
+            <a:pPr algn="ctr"/>
+            <a:r>
+              <a:rPr lang="en-US" dirty="0" smtClean="0"/>
+              <a:t>Fundamental, primary activity</a:t>
+            </a:r>
+            <a:endParaRPr lang="en-US" dirty="0" smtClean="0"/>
+          </a:p>
+        </p:txBody>
+      </p:sp>
+      <p:cxnSp>
+        <p:nvCxnSpPr>
+          <p:cNvPr id="24" name="Elbow Connector 23"/>
+          <p:cNvCxnSpPr>
+            <a:stCxn id="30" idx="3"/>
+            <a:endCxn id="5" idx="1"/>
+          </p:cNvCxnSpPr>
+          <p:nvPr/>
+        </p:nvCxnSpPr>
+        <p:spPr>
+          <a:xfrm>
+            <a:off x="2190725" y="438558"/>
+            <a:ext cx="1122978" cy="381932"/>
+          </a:xfrm>
+          <a:prstGeom prst="bentConnector3">
+            <a:avLst>
+              <a:gd name="adj1" fmla="val 50000"/>
+            </a:avLst>
+          </a:prstGeom>
+          <a:ln>
+            <a:tailEnd type="triangle"/>
+          </a:ln>
+        </p:spPr>
+        <p:style>
+          <a:lnRef idx="1">
+            <a:schemeClr val="accent1"/>
+          </a:lnRef>
+          <a:fillRef idx="0">
+            <a:schemeClr val="accent1"/>
+          </a:fillRef>
+          <a:effectRef idx="0">
+            <a:schemeClr val="accent1"/>
+          </a:effectRef>
+          <a:fontRef idx="minor">
+            <a:schemeClr val="tx1"/>
+          </a:fontRef>
+        </p:style>
+      </p:cxnSp>
+      <p:cxnSp>
+        <p:nvCxnSpPr>
+          <p:cNvPr id="227" name="Straight Arrow Connector 226"/>
+          <p:cNvCxnSpPr>
+            <a:stCxn id="30" idx="2"/>
+            <a:endCxn id="70" idx="0"/>
+          </p:cNvCxnSpPr>
+          <p:nvPr/>
+        </p:nvCxnSpPr>
+        <p:spPr>
+          <a:xfrm>
+            <a:off x="1144127" y="690843"/>
+            <a:ext cx="0" cy="466806"/>
+          </a:xfrm>
+          <a:prstGeom prst="straightConnector1">
+            <a:avLst/>
+          </a:prstGeom>
+          <a:ln>
+            <a:tailEnd type="triangle"/>
+          </a:ln>
+        </p:spPr>
+        <p:style>
+          <a:lnRef idx="1">
+            <a:schemeClr val="accent1"/>
+          </a:lnRef>
+          <a:fillRef idx="0">
+            <a:schemeClr val="accent1"/>
+          </a:fillRef>
+          <a:effectRef idx="0">
+            <a:schemeClr val="accent1"/>
+          </a:effectRef>
+          <a:fontRef idx="minor">
+            <a:schemeClr val="tx1"/>
+          </a:fontRef>
+        </p:style>
+      </p:cxnSp>
+      <p:sp>
+        <p:nvSpPr>
+          <p:cNvPr id="86" name="TextBox 85"/>
+          <p:cNvSpPr txBox="1"/>
+          <p:nvPr/>
+        </p:nvSpPr>
+        <p:spPr>
+          <a:xfrm>
+            <a:off x="928353" y="708910"/>
+            <a:ext cx="878104" cy="369332"/>
+          </a:xfrm>
+          <a:prstGeom prst="rect">
+            <a:avLst/>
+          </a:prstGeom>
+          <a:noFill/>
+        </p:spPr>
+        <p:txBody>
+          <a:bodyPr wrap="square" rtlCol="0">
+            <a:spAutoFit/>
+          </a:bodyPr>
+          <a:lstStyle/>
+          <a:p>
+            <a:pPr algn="ctr"/>
+            <a:r>
+              <a:rPr lang="en-US" dirty="0" smtClean="0">
+                <a:solidFill>
+                  <a:schemeClr val="bg2">
+                    <a:lumMod val="90000"/>
+                  </a:schemeClr>
+                </a:solidFill>
+              </a:rPr>
+              <a:t>Is a</a:t>
+            </a:r>
+            <a:endParaRPr lang="en-US" dirty="0">
+              <a:solidFill>
+                <a:schemeClr val="bg2">
+                  <a:lumMod val="90000"/>
+                </a:schemeClr>
+              </a:solidFill>
+            </a:endParaRPr>
+          </a:p>
+        </p:txBody>
+      </p:sp>
+      <p:sp>
+        <p:nvSpPr>
+          <p:cNvPr id="91" name="Rectangle 90"/>
+          <p:cNvSpPr/>
+          <p:nvPr/>
+        </p:nvSpPr>
+        <p:spPr>
+          <a:xfrm>
+            <a:off x="5067151" y="2493250"/>
+            <a:ext cx="2310784" cy="548640"/>
+          </a:xfrm>
+          <a:prstGeom prst="rect">
+            <a:avLst/>
+          </a:prstGeom>
+          <a:solidFill>
+            <a:schemeClr val="accent2">
+              <a:lumMod val="40000"/>
+              <a:lumOff val="60000"/>
+            </a:schemeClr>
+          </a:solidFill>
+          <a:ln>
+            <a:solidFill>
+              <a:schemeClr val="accent2">
+                <a:lumMod val="40000"/>
+                <a:lumOff val="60000"/>
+              </a:schemeClr>
+            </a:solidFill>
+          </a:ln>
+        </p:spPr>
+        <p:style>
+          <a:lnRef idx="2">
+            <a:schemeClr val="accent1">
+              <a:shade val="50000"/>
+            </a:schemeClr>
+          </a:lnRef>
+          <a:fillRef idx="1">
+            <a:schemeClr val="accent1"/>
+          </a:fillRef>
+          <a:effectRef idx="0">
+            <a:schemeClr val="accent1"/>
+          </a:effectRef>
+          <a:fontRef idx="minor">
+            <a:schemeClr val="lt1"/>
+          </a:fontRef>
+        </p:style>
+        <p:txBody>
+          <a:bodyPr rtlCol="0" anchor="ctr"/>
+          <a:lstStyle/>
+          <a:p>
+            <a:pPr algn="ctr"/>
+            <a:r>
+              <a:rPr lang="en-US" b="1" dirty="0" smtClean="0"/>
+              <a:t>separated with comma: </a:t>
+            </a:r>
+            <a:r>
+              <a:rPr lang="en-US" b="1" dirty="0" smtClean="0"/>
+              <a:t>,</a:t>
+            </a:r>
+          </a:p>
+        </p:txBody>
+      </p:sp>
+      <p:cxnSp>
+        <p:nvCxnSpPr>
+          <p:cNvPr id="236" name="Elbow Connector 235"/>
+          <p:cNvCxnSpPr>
+            <a:stCxn id="91" idx="1"/>
+          </p:cNvCxnSpPr>
+          <p:nvPr/>
+        </p:nvCxnSpPr>
+        <p:spPr>
+          <a:xfrm rot="10800000">
+            <a:off x="4831933" y="2450334"/>
+            <a:ext cx="235219" cy="317237"/>
+          </a:xfrm>
+          <a:prstGeom prst="bentConnector2">
+            <a:avLst/>
+          </a:prstGeom>
+          <a:ln>
+            <a:tailEnd type="triangle"/>
+          </a:ln>
+        </p:spPr>
+        <p:style>
+          <a:lnRef idx="1">
+            <a:schemeClr val="accent1"/>
+          </a:lnRef>
+          <a:fillRef idx="0">
+            <a:schemeClr val="accent1"/>
+          </a:fillRef>
+          <a:effectRef idx="0">
+            <a:schemeClr val="accent1"/>
+          </a:effectRef>
+          <a:fontRef idx="minor">
+            <a:schemeClr val="tx1"/>
+          </a:fontRef>
+        </p:style>
+      </p:cxnSp>
+      <p:sp>
+        <p:nvSpPr>
+          <p:cNvPr id="100" name="TextBox 99"/>
+          <p:cNvSpPr txBox="1"/>
+          <p:nvPr/>
+        </p:nvSpPr>
+        <p:spPr>
+          <a:xfrm>
+            <a:off x="2244661" y="1512284"/>
+            <a:ext cx="1393654" cy="369332"/>
+          </a:xfrm>
+          <a:prstGeom prst="rect">
+            <a:avLst/>
+          </a:prstGeom>
+          <a:noFill/>
+        </p:spPr>
+        <p:txBody>
+          <a:bodyPr wrap="square" rtlCol="0">
+            <a:spAutoFit/>
+          </a:bodyPr>
+          <a:lstStyle/>
+          <a:p>
+            <a:pPr algn="ctr"/>
+            <a:r>
+              <a:rPr lang="en-US" dirty="0" smtClean="0">
+                <a:solidFill>
+                  <a:schemeClr val="bg2">
+                    <a:lumMod val="90000"/>
+                  </a:schemeClr>
+                </a:solidFill>
+              </a:rPr>
+              <a:t>Function!</a:t>
+            </a:r>
+            <a:endParaRPr lang="en-US" dirty="0">
+              <a:solidFill>
+                <a:schemeClr val="bg2">
+                  <a:lumMod val="90000"/>
+                </a:schemeClr>
+              </a:solidFill>
+            </a:endParaRPr>
+          </a:p>
+        </p:txBody>
+      </p:sp>
+      <p:sp>
+        <p:nvSpPr>
+          <p:cNvPr id="103" name="Rectangle 102"/>
+          <p:cNvSpPr/>
+          <p:nvPr/>
+        </p:nvSpPr>
+        <p:spPr>
+          <a:xfrm>
+            <a:off x="6155333" y="5714372"/>
+            <a:ext cx="1180408" cy="548640"/>
+          </a:xfrm>
+          <a:prstGeom prst="rect">
+            <a:avLst/>
+          </a:prstGeom>
+          <a:solidFill>
+            <a:schemeClr val="accent2"/>
+          </a:solidFill>
+          <a:ln>
+            <a:solidFill>
+              <a:schemeClr val="accent2"/>
+            </a:solidFill>
+          </a:ln>
+        </p:spPr>
+        <p:style>
+          <a:lnRef idx="2">
+            <a:schemeClr val="accent1">
+              <a:shade val="50000"/>
+            </a:schemeClr>
+          </a:lnRef>
+          <a:fillRef idx="1">
+            <a:schemeClr val="accent1"/>
+          </a:fillRef>
+          <a:effectRef idx="0">
+            <a:schemeClr val="accent1"/>
+          </a:effectRef>
+          <a:fontRef idx="minor">
+            <a:schemeClr val="lt1"/>
+          </a:fontRef>
+        </p:style>
+        <p:txBody>
+          <a:bodyPr rtlCol="0" anchor="ctr"/>
+          <a:lstStyle/>
+          <a:p>
+            <a:pPr algn="ctr"/>
+            <a:r>
+              <a:rPr lang="en-US" b="1" dirty="0" err="1" smtClean="0"/>
+              <a:t>dplyr</a:t>
+            </a:r>
+            <a:r>
+              <a:rPr lang="en-US" b="1" dirty="0" smtClean="0"/>
+              <a:t> </a:t>
+            </a:r>
+            <a:endParaRPr lang="en-US" b="1" dirty="0" smtClean="0"/>
+          </a:p>
+        </p:txBody>
+      </p:sp>
+      <p:cxnSp>
+        <p:nvCxnSpPr>
+          <p:cNvPr id="248" name="Elbow Connector 247"/>
+          <p:cNvCxnSpPr>
+            <a:stCxn id="219" idx="3"/>
+            <a:endCxn id="103" idx="0"/>
+          </p:cNvCxnSpPr>
+          <p:nvPr/>
+        </p:nvCxnSpPr>
+        <p:spPr>
+          <a:xfrm>
+            <a:off x="6513694" y="3906558"/>
+            <a:ext cx="231843" cy="1807814"/>
+          </a:xfrm>
+          <a:prstGeom prst="bentConnector2">
+            <a:avLst/>
+          </a:prstGeom>
+          <a:ln>
+            <a:tailEnd type="triangle"/>
+          </a:ln>
+        </p:spPr>
+        <p:style>
+          <a:lnRef idx="1">
+            <a:schemeClr val="accent1"/>
+          </a:lnRef>
+          <a:fillRef idx="0">
+            <a:schemeClr val="accent1"/>
+          </a:fillRef>
+          <a:effectRef idx="0">
+            <a:schemeClr val="accent1"/>
+          </a:effectRef>
+          <a:fontRef idx="minor">
+            <a:schemeClr val="tx1"/>
+          </a:fontRef>
+        </p:style>
+      </p:cxnSp>
+      <p:sp>
+        <p:nvSpPr>
+          <p:cNvPr id="106" name="TextBox 105"/>
+          <p:cNvSpPr txBox="1"/>
+          <p:nvPr/>
+        </p:nvSpPr>
+        <p:spPr>
+          <a:xfrm>
+            <a:off x="6108323" y="5365522"/>
+            <a:ext cx="679407" cy="369332"/>
+          </a:xfrm>
+          <a:prstGeom prst="rect">
+            <a:avLst/>
+          </a:prstGeom>
+          <a:noFill/>
+        </p:spPr>
+        <p:txBody>
+          <a:bodyPr wrap="square" rtlCol="0">
+            <a:spAutoFit/>
+          </a:bodyPr>
+          <a:lstStyle/>
+          <a:p>
+            <a:pPr algn="ctr"/>
+            <a:r>
+              <a:rPr lang="en-US" dirty="0" smtClean="0">
+                <a:solidFill>
+                  <a:schemeClr val="bg2">
+                    <a:lumMod val="90000"/>
+                  </a:schemeClr>
+                </a:solidFill>
+              </a:rPr>
+              <a:t>From</a:t>
             </a:r>
             <a:endParaRPr lang="en-US" dirty="0">
               <a:solidFill>

</xml_diff>